<commit_message>
typo in big variable declaration example
</commit_message>
<xml_diff>
--- a/Lesson1.pptx
+++ b/Lesson1.pptx
@@ -208,7 +208,7 @@
           <a:p>
             <a:fld id="{B3E85FA4-0BF1-4624-B558-8D6F7C4705DF}" type="datetimeFigureOut">
               <a:rPr lang="en-US" smtClean="0"/>
-              <a:t>5/8/2013</a:t>
+              <a:t>5/28/2013</a:t>
             </a:fld>
             <a:endParaRPr lang="en-US"/>
           </a:p>
@@ -1386,19 +1386,7 @@
             </a:r>
             <a:r>
               <a:rPr lang="en-US" baseline="0" dirty="0" smtClean="0"/>
-              <a:t> say “inside the function”, you have to be inside the braces. </a:t>
-            </a:r>
-            <a:r>
-              <a:rPr lang="en-US" baseline="0" dirty="0" smtClean="0"/>
-              <a:t>And it’s the converse if </a:t>
-            </a:r>
-            <a:r>
-              <a:rPr lang="en-US" baseline="0" dirty="0" smtClean="0"/>
-              <a:t>I say “before the function” or “after the function</a:t>
-            </a:r>
-            <a:r>
-              <a:rPr lang="en-US" baseline="0" dirty="0" smtClean="0"/>
-              <a:t>” – go OUTSIDE the braces in those cases.</a:t>
+              <a:t> say “inside the function”, you have to be inside the braces. And it’s the converse if I say “before the function” or “after the function” – go OUTSIDE the braces in those cases.</a:t>
             </a:r>
             <a:endParaRPr lang="en-US" dirty="0"/>
           </a:p>
@@ -2104,7 +2092,7 @@
           <a:p>
             <a:fld id="{0E2A55ED-DD07-4463-BF52-CBAFC7E1266F}" type="datetimeFigureOut">
               <a:rPr lang="en-US" smtClean="0"/>
-              <a:t>5/8/2013</a:t>
+              <a:t>5/28/2013</a:t>
             </a:fld>
             <a:endParaRPr lang="en-US"/>
           </a:p>
@@ -2276,7 +2264,7 @@
           <a:p>
             <a:fld id="{0E2A55ED-DD07-4463-BF52-CBAFC7E1266F}" type="datetimeFigureOut">
               <a:rPr lang="en-US" smtClean="0"/>
-              <a:t>5/8/2013</a:t>
+              <a:t>5/28/2013</a:t>
             </a:fld>
             <a:endParaRPr lang="en-US"/>
           </a:p>
@@ -2458,7 +2446,7 @@
           <a:p>
             <a:fld id="{0E2A55ED-DD07-4463-BF52-CBAFC7E1266F}" type="datetimeFigureOut">
               <a:rPr lang="en-US" smtClean="0"/>
-              <a:t>5/8/2013</a:t>
+              <a:t>5/28/2013</a:t>
             </a:fld>
             <a:endParaRPr lang="en-US"/>
           </a:p>
@@ -2635,7 +2623,7 @@
           <a:p>
             <a:fld id="{0E2A55ED-DD07-4463-BF52-CBAFC7E1266F}" type="datetimeFigureOut">
               <a:rPr lang="en-US" smtClean="0"/>
-              <a:t>5/8/2013</a:t>
+              <a:t>5/28/2013</a:t>
             </a:fld>
             <a:endParaRPr lang="en-US"/>
           </a:p>
@@ -2759,7 +2747,7 @@
           <a:p>
             <a:fld id="{0E2A55ED-DD07-4463-BF52-CBAFC7E1266F}" type="datetimeFigureOut">
               <a:rPr lang="en-US" smtClean="0"/>
-              <a:t>5/8/2013</a:t>
+              <a:t>5/28/2013</a:t>
             </a:fld>
             <a:endParaRPr lang="en-US"/>
           </a:p>
@@ -3038,7 +3026,7 @@
           <a:p>
             <a:fld id="{0E2A55ED-DD07-4463-BF52-CBAFC7E1266F}" type="datetimeFigureOut">
               <a:rPr lang="en-US" smtClean="0"/>
-              <a:t>5/8/2013</a:t>
+              <a:t>5/28/2013</a:t>
             </a:fld>
             <a:endParaRPr lang="en-US"/>
           </a:p>
@@ -3307,7 +3295,7 @@
           <a:p>
             <a:fld id="{0E2A55ED-DD07-4463-BF52-CBAFC7E1266F}" type="datetimeFigureOut">
               <a:rPr lang="en-US" smtClean="0"/>
-              <a:t>5/8/2013</a:t>
+              <a:t>5/28/2013</a:t>
             </a:fld>
             <a:endParaRPr lang="en-US"/>
           </a:p>
@@ -3761,7 +3749,7 @@
           <a:p>
             <a:fld id="{0E2A55ED-DD07-4463-BF52-CBAFC7E1266F}" type="datetimeFigureOut">
               <a:rPr lang="en-US" smtClean="0"/>
-              <a:t>5/8/2013</a:t>
+              <a:t>5/28/2013</a:t>
             </a:fld>
             <a:endParaRPr lang="en-US"/>
           </a:p>
@@ -3881,7 +3869,7 @@
           <a:p>
             <a:fld id="{0E2A55ED-DD07-4463-BF52-CBAFC7E1266F}" type="datetimeFigureOut">
               <a:rPr lang="en-US" smtClean="0"/>
-              <a:t>5/8/2013</a:t>
+              <a:t>5/28/2013</a:t>
             </a:fld>
             <a:endParaRPr lang="en-US"/>
           </a:p>
@@ -4138,7 +4126,7 @@
           <a:p>
             <a:fld id="{0E2A55ED-DD07-4463-BF52-CBAFC7E1266F}" type="datetimeFigureOut">
               <a:rPr lang="en-US" smtClean="0"/>
-              <a:t>5/8/2013</a:t>
+              <a:t>5/28/2013</a:t>
             </a:fld>
             <a:endParaRPr lang="en-US"/>
           </a:p>
@@ -4385,7 +4373,7 @@
           <a:p>
             <a:fld id="{0E2A55ED-DD07-4463-BF52-CBAFC7E1266F}" type="datetimeFigureOut">
               <a:rPr lang="en-US" smtClean="0"/>
-              <a:t>5/8/2013</a:t>
+              <a:t>5/28/2013</a:t>
             </a:fld>
             <a:endParaRPr lang="en-US"/>
           </a:p>
@@ -4565,7 +4553,7 @@
           <a:p>
             <a:fld id="{0E2A55ED-DD07-4463-BF52-CBAFC7E1266F}" type="datetimeFigureOut">
               <a:rPr lang="en-US" smtClean="0"/>
-              <a:t>5/8/2013</a:t>
+              <a:t>5/28/2013</a:t>
             </a:fld>
             <a:endParaRPr lang="en-US"/>
           </a:p>
@@ -7160,11 +7148,7 @@
             </a:pPr>
             <a:r>
               <a:rPr lang="en-US" dirty="0" smtClean="0"/>
-              <a:t>After </a:t>
-            </a:r>
-            <a:r>
-              <a:rPr lang="en-US" dirty="0" smtClean="0"/>
-              <a:t>each step, Save</a:t>
+              <a:t>After each step, Save</a:t>
             </a:r>
           </a:p>
           <a:p>
@@ -7484,15 +7468,7 @@
           <a:p>
             <a:r>
               <a:rPr lang="en-US" dirty="0" smtClean="0"/>
-              <a:t>Stream Gage Data </a:t>
-            </a:r>
-            <a:r>
-              <a:rPr lang="en-US" dirty="0" smtClean="0"/>
-              <a:t>(Ex1, Step </a:t>
-            </a:r>
-            <a:r>
-              <a:rPr lang="en-US" dirty="0" smtClean="0"/>
-              <a:t>2)</a:t>
+              <a:t>Stream Gage Data (Ex1, Step 2)</a:t>
             </a:r>
             <a:endParaRPr lang="en-US" dirty="0"/>
           </a:p>
@@ -8616,17 +8592,14 @@
               <a:t>option2: </a:t>
             </a:r>
             <a:r>
-              <a:rPr lang="en-US" sz="2800" dirty="0" err="1">
+              <a:rPr lang="en-US" sz="2800" smtClean="0">
                 <a:solidFill>
                   <a:srgbClr val="FF0000"/>
                 </a:solidFill>
               </a:rPr>
               <a:t>latlng</a:t>
             </a:r>
-            <a:r>
-              <a:rPr lang="en-US" sz="2800" dirty="0"/>
-              <a:t>,</a:t>
-            </a:r>
+            <a:endParaRPr lang="en-US" sz="2800" dirty="0"/>
           </a:p>
           <a:p>
             <a:r>

</xml_diff>